<commit_message>
Final specification draft 1
</commit_message>
<xml_diff>
--- a/Walkthrough/Walkthrough.pptx
+++ b/Walkthrough/Walkthrough.pptx
@@ -264,7 +264,7 @@
           <a:p>
             <a:fld id="{8B1F6BEF-6D8B-4DEB-9E20-05E468EF1E47}" type="datetimeFigureOut">
               <a:rPr lang="en-GB" smtClean="0"/>
-              <a:t>13/02/2019</a:t>
+              <a:t>14/02/2019</a:t>
             </a:fld>
             <a:endParaRPr lang="en-GB"/>
           </a:p>
@@ -464,7 +464,7 @@
           <a:p>
             <a:fld id="{8B1F6BEF-6D8B-4DEB-9E20-05E468EF1E47}" type="datetimeFigureOut">
               <a:rPr lang="en-GB" smtClean="0"/>
-              <a:t>13/02/2019</a:t>
+              <a:t>14/02/2019</a:t>
             </a:fld>
             <a:endParaRPr lang="en-GB"/>
           </a:p>
@@ -674,7 +674,7 @@
           <a:p>
             <a:fld id="{8B1F6BEF-6D8B-4DEB-9E20-05E468EF1E47}" type="datetimeFigureOut">
               <a:rPr lang="en-GB" smtClean="0"/>
-              <a:t>13/02/2019</a:t>
+              <a:t>14/02/2019</a:t>
             </a:fld>
             <a:endParaRPr lang="en-GB"/>
           </a:p>
@@ -874,7 +874,7 @@
           <a:p>
             <a:fld id="{8B1F6BEF-6D8B-4DEB-9E20-05E468EF1E47}" type="datetimeFigureOut">
               <a:rPr lang="en-GB" smtClean="0"/>
-              <a:t>13/02/2019</a:t>
+              <a:t>14/02/2019</a:t>
             </a:fld>
             <a:endParaRPr lang="en-GB"/>
           </a:p>
@@ -1150,7 +1150,7 @@
           <a:p>
             <a:fld id="{8B1F6BEF-6D8B-4DEB-9E20-05E468EF1E47}" type="datetimeFigureOut">
               <a:rPr lang="en-GB" smtClean="0"/>
-              <a:t>13/02/2019</a:t>
+              <a:t>14/02/2019</a:t>
             </a:fld>
             <a:endParaRPr lang="en-GB"/>
           </a:p>
@@ -1418,7 +1418,7 @@
           <a:p>
             <a:fld id="{8B1F6BEF-6D8B-4DEB-9E20-05E468EF1E47}" type="datetimeFigureOut">
               <a:rPr lang="en-GB" smtClean="0"/>
-              <a:t>13/02/2019</a:t>
+              <a:t>14/02/2019</a:t>
             </a:fld>
             <a:endParaRPr lang="en-GB"/>
           </a:p>
@@ -1833,7 +1833,7 @@
           <a:p>
             <a:fld id="{8B1F6BEF-6D8B-4DEB-9E20-05E468EF1E47}" type="datetimeFigureOut">
               <a:rPr lang="en-GB" smtClean="0"/>
-              <a:t>13/02/2019</a:t>
+              <a:t>14/02/2019</a:t>
             </a:fld>
             <a:endParaRPr lang="en-GB"/>
           </a:p>
@@ -1975,7 +1975,7 @@
           <a:p>
             <a:fld id="{8B1F6BEF-6D8B-4DEB-9E20-05E468EF1E47}" type="datetimeFigureOut">
               <a:rPr lang="en-GB" smtClean="0"/>
-              <a:t>13/02/2019</a:t>
+              <a:t>14/02/2019</a:t>
             </a:fld>
             <a:endParaRPr lang="en-GB"/>
           </a:p>
@@ -2088,7 +2088,7 @@
           <a:p>
             <a:fld id="{8B1F6BEF-6D8B-4DEB-9E20-05E468EF1E47}" type="datetimeFigureOut">
               <a:rPr lang="en-GB" smtClean="0"/>
-              <a:t>13/02/2019</a:t>
+              <a:t>14/02/2019</a:t>
             </a:fld>
             <a:endParaRPr lang="en-GB"/>
           </a:p>
@@ -2401,7 +2401,7 @@
           <a:p>
             <a:fld id="{8B1F6BEF-6D8B-4DEB-9E20-05E468EF1E47}" type="datetimeFigureOut">
               <a:rPr lang="en-GB" smtClean="0"/>
-              <a:t>13/02/2019</a:t>
+              <a:t>14/02/2019</a:t>
             </a:fld>
             <a:endParaRPr lang="en-GB"/>
           </a:p>
@@ -2690,7 +2690,7 @@
           <a:p>
             <a:fld id="{8B1F6BEF-6D8B-4DEB-9E20-05E468EF1E47}" type="datetimeFigureOut">
               <a:rPr lang="en-GB" smtClean="0"/>
-              <a:t>13/02/2019</a:t>
+              <a:t>14/02/2019</a:t>
             </a:fld>
             <a:endParaRPr lang="en-GB"/>
           </a:p>
@@ -2933,7 +2933,7 @@
           <a:p>
             <a:fld id="{8B1F6BEF-6D8B-4DEB-9E20-05E468EF1E47}" type="datetimeFigureOut">
               <a:rPr lang="en-GB" smtClean="0"/>
-              <a:t>13/02/2019</a:t>
+              <a:t>14/02/2019</a:t>
             </a:fld>
             <a:endParaRPr lang="en-GB"/>
           </a:p>
@@ -3406,7 +3406,9 @@
         </p:nvSpPr>
         <p:spPr/>
         <p:txBody>
-          <a:bodyPr/>
+          <a:bodyPr>
+            <a:normAutofit fontScale="40000" lnSpcReduction="20000"/>
+          </a:bodyPr>
           <a:lstStyle/>
           <a:p>
             <a:r>
@@ -3415,10 +3417,46 @@
             </a:r>
           </a:p>
           <a:p>
+            <a:endParaRPr lang="en-US" dirty="0"/>
+          </a:p>
+          <a:p>
             <a:r>
               <a:rPr lang="en-US" dirty="0"/>
-              <a:t>Names and student id’s here?</a:t>
-            </a:r>
+              <a:t>Mohammad Majid – 2324127</a:t>
+            </a:r>
+          </a:p>
+          <a:p>
+            <a:r>
+              <a:rPr lang="en-US" dirty="0"/>
+              <a:t>Euan John Ferguson – 2323460</a:t>
+            </a:r>
+          </a:p>
+          <a:p>
+            <a:r>
+              <a:rPr lang="en-US" dirty="0"/>
+              <a:t>Matthew Wilson – 2251532</a:t>
+            </a:r>
+          </a:p>
+          <a:p>
+            <a:r>
+              <a:rPr lang="en-US" dirty="0"/>
+              <a:t>Jasmine </a:t>
+            </a:r>
+            <a:r>
+              <a:rPr lang="en-US" dirty="0" err="1"/>
+              <a:t>Naowarat</a:t>
+            </a:r>
+            <a:r>
+              <a:rPr lang="en-US" dirty="0"/>
+              <a:t> Casey – 2325421</a:t>
+            </a:r>
+          </a:p>
+          <a:p>
+            <a:r>
+              <a:rPr lang="en-US"/>
+              <a:t>James Bradford - 2324024</a:t>
+            </a:r>
+            <a:endParaRPr lang="en-US" dirty="0"/>
           </a:p>
         </p:txBody>
       </p:sp>
@@ -3454,7 +3492,7 @@
       </p:grpSpPr>
       <p:pic>
         <p:nvPicPr>
-          <p:cNvPr id="8" name="Picture 7" descr="A picture containing screenshot&#13;&#10;&#13;&#10;Description automatically generated">
+          <p:cNvPr id="8" name="Picture 7">
             <a:extLst>
               <a:ext uri="{FF2B5EF4-FFF2-40B4-BE49-F238E27FC236}">
                 <a16:creationId xmlns:a16="http://schemas.microsoft.com/office/drawing/2014/main" id="{F2A53E39-3197-C949-BA76-771C6F01DE62}"/>
@@ -3480,8 +3518,8 @@
         </p:blipFill>
         <p:spPr>
           <a:xfrm>
-            <a:off x="838200" y="843230"/>
-            <a:ext cx="10515600" cy="5253624"/>
+            <a:off x="838200" y="1150624"/>
+            <a:ext cx="10515600" cy="4638835"/>
           </a:xfrm>
           <a:prstGeom prst="rect">
             <a:avLst/>
@@ -3580,14 +3618,14 @@
           <p:nvPr>
             <p:extLst>
               <p:ext uri="{D42A27DB-BD31-4B8C-83A1-F6EECF244321}">
-                <p14:modId xmlns:p14="http://schemas.microsoft.com/office/powerpoint/2010/main" val="3286469372"/>
+                <p14:modId xmlns:p14="http://schemas.microsoft.com/office/powerpoint/2010/main" val="3781902175"/>
               </p:ext>
             </p:extLst>
           </p:nvPr>
         </p:nvGraphicFramePr>
         <p:xfrm>
           <a:off x="838198" y="1293541"/>
-          <a:ext cx="9197900" cy="4754880"/>
+          <a:ext cx="9197900" cy="4358640"/>
         </p:xfrm>
         <a:graphic>
           <a:graphicData uri="http://schemas.openxmlformats.org/drawingml/2006/table">
@@ -3617,113 +3655,6 @@
                     <a:bodyPr/>
                     <a:lstStyle/>
                     <a:p>
-                      <a:pPr marL="0" marR="0" lvl="0" indent="0" algn="l" defTabSz="914400" rtl="0" eaLnBrk="1" fontAlgn="auto" latinLnBrk="0" hangingPunct="1">
-                        <a:lnSpc>
-                          <a:spcPct val="100000"/>
-                        </a:lnSpc>
-                        <a:spcBef>
-                          <a:spcPts val="0"/>
-                        </a:spcBef>
-                        <a:spcAft>
-                          <a:spcPts val="0"/>
-                        </a:spcAft>
-                        <a:buClrTx/>
-                        <a:buSzTx/>
-                        <a:buFontTx/>
-                        <a:buNone/>
-                        <a:tabLst/>
-                        <a:defRPr/>
-                      </a:pPr>
-                      <a:r>
-                        <a:rPr lang="en-GB" sz="2000" dirty="0">
-                          <a:solidFill>
-                            <a:schemeClr val="tx1"/>
-                          </a:solidFill>
-                        </a:rPr>
-                        <a:t>Main</a:t>
-                      </a:r>
-                      <a:endParaRPr lang="en-US" sz="2000" dirty="0">
-                        <a:solidFill>
-                          <a:schemeClr val="tx1"/>
-                        </a:solidFill>
-                      </a:endParaRPr>
-                    </a:p>
-                  </a:txBody>
-                  <a:tcPr>
-                    <a:lnL w="12700" cmpd="sng">
-                      <a:noFill/>
-                    </a:lnL>
-                    <a:lnR w="12700" cmpd="sng">
-                      <a:noFill/>
-                    </a:lnR>
-                    <a:lnT w="12700" cmpd="sng">
-                      <a:noFill/>
-                    </a:lnT>
-                    <a:lnB w="38100" cmpd="sng">
-                      <a:noFill/>
-                    </a:lnB>
-                    <a:lnTlToBr w="12700" cmpd="sng">
-                      <a:noFill/>
-                      <a:prstDash val="solid"/>
-                    </a:lnTlToBr>
-                    <a:lnBlToTr w="12700" cmpd="sng">
-                      <a:noFill/>
-                      <a:prstDash val="solid"/>
-                    </a:lnBlToTr>
-                    <a:noFill/>
-                  </a:tcPr>
-                </a:tc>
-                <a:tc>
-                  <a:txBody>
-                    <a:bodyPr/>
-                    <a:lstStyle/>
-                    <a:p>
-                      <a:r>
-                        <a:rPr lang="en-US" sz="2000" dirty="0">
-                          <a:solidFill>
-                            <a:schemeClr val="tx1"/>
-                          </a:solidFill>
-                        </a:rPr>
-                        <a:t>Account</a:t>
-                      </a:r>
-                    </a:p>
-                  </a:txBody>
-                  <a:tcPr>
-                    <a:lnL w="12700" cmpd="sng">
-                      <a:noFill/>
-                    </a:lnL>
-                    <a:lnR w="12700" cmpd="sng">
-                      <a:noFill/>
-                    </a:lnR>
-                    <a:lnT w="12700" cmpd="sng">
-                      <a:noFill/>
-                    </a:lnT>
-                    <a:lnB w="38100" cmpd="sng">
-                      <a:noFill/>
-                    </a:lnB>
-                    <a:lnTlToBr w="12700" cmpd="sng">
-                      <a:noFill/>
-                      <a:prstDash val="solid"/>
-                    </a:lnTlToBr>
-                    <a:lnBlToTr w="12700" cmpd="sng">
-                      <a:noFill/>
-                      <a:prstDash val="solid"/>
-                    </a:lnBlToTr>
-                    <a:noFill/>
-                  </a:tcPr>
-                </a:tc>
-                <a:extLst>
-                  <a:ext uri="{0D108BD9-81ED-4DB2-BD59-A6C34878D82A}">
-                    <a16:rowId xmlns:a16="http://schemas.microsoft.com/office/drawing/2014/main" val="2481433932"/>
-                  </a:ext>
-                </a:extLst>
-              </a:tr>
-              <a:tr h="370840">
-                <a:tc>
-                  <a:txBody>
-                    <a:bodyPr/>
-                    <a:lstStyle/>
-                    <a:p>
                       <a:r>
                         <a:rPr lang="en-US" sz="2000" b="0" dirty="0">
                           <a:solidFill>
@@ -3735,17 +3666,41 @@
                     </a:p>
                   </a:txBody>
                   <a:tcPr>
-                    <a:lnL w="12700" cmpd="sng">
-                      <a:noFill/>
+                    <a:lnL w="12700" cap="flat" cmpd="sng" algn="ctr">
+                      <a:solidFill>
+                        <a:schemeClr val="tx1"/>
+                      </a:solidFill>
+                      <a:prstDash val="solid"/>
+                      <a:round/>
+                      <a:headEnd type="none" w="med" len="med"/>
+                      <a:tailEnd type="none" w="med" len="med"/>
                     </a:lnL>
-                    <a:lnR w="12700" cmpd="sng">
-                      <a:noFill/>
+                    <a:lnR w="12700" cap="flat" cmpd="sng" algn="ctr">
+                      <a:solidFill>
+                        <a:schemeClr val="tx1"/>
+                      </a:solidFill>
+                      <a:prstDash val="solid"/>
+                      <a:round/>
+                      <a:headEnd type="none" w="med" len="med"/>
+                      <a:tailEnd type="none" w="med" len="med"/>
                     </a:lnR>
-                    <a:lnT w="38100" cmpd="sng">
-                      <a:noFill/>
+                    <a:lnT w="12700" cap="flat" cmpd="sng" algn="ctr">
+                      <a:solidFill>
+                        <a:schemeClr val="tx1"/>
+                      </a:solidFill>
+                      <a:prstDash val="solid"/>
+                      <a:round/>
+                      <a:headEnd type="none" w="med" len="med"/>
+                      <a:tailEnd type="none" w="med" len="med"/>
                     </a:lnT>
-                    <a:lnB w="12700" cmpd="sng">
-                      <a:noFill/>
+                    <a:lnB w="12700" cap="flat" cmpd="sng" algn="ctr">
+                      <a:solidFill>
+                        <a:schemeClr val="tx1"/>
+                      </a:solidFill>
+                      <a:prstDash val="solid"/>
+                      <a:round/>
+                      <a:headEnd type="none" w="med" len="med"/>
+                      <a:tailEnd type="none" w="med" len="med"/>
                     </a:lnB>
                     <a:lnTlToBr w="12700" cmpd="sng">
                       <a:noFill/>
@@ -3774,17 +3729,41 @@
                     </a:p>
                   </a:txBody>
                   <a:tcPr>
-                    <a:lnL w="12700" cmpd="sng">
-                      <a:noFill/>
+                    <a:lnL w="12700" cap="flat" cmpd="sng" algn="ctr">
+                      <a:solidFill>
+                        <a:schemeClr val="tx1"/>
+                      </a:solidFill>
+                      <a:prstDash val="solid"/>
+                      <a:round/>
+                      <a:headEnd type="none" w="med" len="med"/>
+                      <a:tailEnd type="none" w="med" len="med"/>
                     </a:lnL>
-                    <a:lnR w="12700" cmpd="sng">
-                      <a:noFill/>
+                    <a:lnR w="12700" cap="flat" cmpd="sng" algn="ctr">
+                      <a:solidFill>
+                        <a:schemeClr val="tx1"/>
+                      </a:solidFill>
+                      <a:prstDash val="solid"/>
+                      <a:round/>
+                      <a:headEnd type="none" w="med" len="med"/>
+                      <a:tailEnd type="none" w="med" len="med"/>
                     </a:lnR>
-                    <a:lnT w="38100" cmpd="sng">
-                      <a:noFill/>
+                    <a:lnT w="12700" cap="flat" cmpd="sng" algn="ctr">
+                      <a:solidFill>
+                        <a:schemeClr val="tx1"/>
+                      </a:solidFill>
+                      <a:prstDash val="solid"/>
+                      <a:round/>
+                      <a:headEnd type="none" w="med" len="med"/>
+                      <a:tailEnd type="none" w="med" len="med"/>
                     </a:lnT>
-                    <a:lnB w="12700" cmpd="sng">
-                      <a:noFill/>
+                    <a:lnB w="12700" cap="flat" cmpd="sng" algn="ctr">
+                      <a:solidFill>
+                        <a:schemeClr val="tx1"/>
+                      </a:solidFill>
+                      <a:prstDash val="solid"/>
+                      <a:round/>
+                      <a:headEnd type="none" w="med" len="med"/>
+                      <a:tailEnd type="none" w="med" len="med"/>
                     </a:lnB>
                     <a:lnTlToBr w="12700" cmpd="sng">
                       <a:noFill/>
@@ -3820,17 +3799,41 @@
                     </a:p>
                   </a:txBody>
                   <a:tcPr>
-                    <a:lnL w="12700" cmpd="sng">
-                      <a:noFill/>
+                    <a:lnL w="12700" cap="flat" cmpd="sng" algn="ctr">
+                      <a:solidFill>
+                        <a:schemeClr val="tx1"/>
+                      </a:solidFill>
+                      <a:prstDash val="solid"/>
+                      <a:round/>
+                      <a:headEnd type="none" w="med" len="med"/>
+                      <a:tailEnd type="none" w="med" len="med"/>
                     </a:lnL>
-                    <a:lnR w="12700" cmpd="sng">
-                      <a:noFill/>
+                    <a:lnR w="12700" cap="flat" cmpd="sng" algn="ctr">
+                      <a:solidFill>
+                        <a:schemeClr val="tx1"/>
+                      </a:solidFill>
+                      <a:prstDash val="solid"/>
+                      <a:round/>
+                      <a:headEnd type="none" w="med" len="med"/>
+                      <a:tailEnd type="none" w="med" len="med"/>
                     </a:lnR>
-                    <a:lnT w="12700" cmpd="sng">
-                      <a:noFill/>
+                    <a:lnT w="12700" cap="flat" cmpd="sng" algn="ctr">
+                      <a:solidFill>
+                        <a:schemeClr val="tx1"/>
+                      </a:solidFill>
+                      <a:prstDash val="solid"/>
+                      <a:round/>
+                      <a:headEnd type="none" w="med" len="med"/>
+                      <a:tailEnd type="none" w="med" len="med"/>
                     </a:lnT>
-                    <a:lnB w="12700" cmpd="sng">
-                      <a:noFill/>
+                    <a:lnB w="12700" cap="flat" cmpd="sng" algn="ctr">
+                      <a:solidFill>
+                        <a:schemeClr val="tx1"/>
+                      </a:solidFill>
+                      <a:prstDash val="solid"/>
+                      <a:round/>
+                      <a:headEnd type="none" w="med" len="med"/>
+                      <a:tailEnd type="none" w="med" len="med"/>
                     </a:lnB>
                     <a:lnTlToBr w="12700" cmpd="sng">
                       <a:noFill/>
@@ -3859,17 +3862,41 @@
                     </a:p>
                   </a:txBody>
                   <a:tcPr>
-                    <a:lnL w="12700" cmpd="sng">
-                      <a:noFill/>
+                    <a:lnL w="12700" cap="flat" cmpd="sng" algn="ctr">
+                      <a:solidFill>
+                        <a:schemeClr val="tx1"/>
+                      </a:solidFill>
+                      <a:prstDash val="solid"/>
+                      <a:round/>
+                      <a:headEnd type="none" w="med" len="med"/>
+                      <a:tailEnd type="none" w="med" len="med"/>
                     </a:lnL>
-                    <a:lnR w="12700" cmpd="sng">
-                      <a:noFill/>
+                    <a:lnR w="12700" cap="flat" cmpd="sng" algn="ctr">
+                      <a:solidFill>
+                        <a:schemeClr val="tx1"/>
+                      </a:solidFill>
+                      <a:prstDash val="solid"/>
+                      <a:round/>
+                      <a:headEnd type="none" w="med" len="med"/>
+                      <a:tailEnd type="none" w="med" len="med"/>
                     </a:lnR>
-                    <a:lnT w="12700" cmpd="sng">
-                      <a:noFill/>
+                    <a:lnT w="12700" cap="flat" cmpd="sng" algn="ctr">
+                      <a:solidFill>
+                        <a:schemeClr val="tx1"/>
+                      </a:solidFill>
+                      <a:prstDash val="solid"/>
+                      <a:round/>
+                      <a:headEnd type="none" w="med" len="med"/>
+                      <a:tailEnd type="none" w="med" len="med"/>
                     </a:lnT>
-                    <a:lnB w="12700" cmpd="sng">
-                      <a:noFill/>
+                    <a:lnB w="12700" cap="flat" cmpd="sng" algn="ctr">
+                      <a:solidFill>
+                        <a:schemeClr val="tx1"/>
+                      </a:solidFill>
+                      <a:prstDash val="solid"/>
+                      <a:round/>
+                      <a:headEnd type="none" w="med" len="med"/>
+                      <a:tailEnd type="none" w="med" len="med"/>
                     </a:lnB>
                     <a:lnTlToBr w="12700" cmpd="sng">
                       <a:noFill/>
@@ -3905,17 +3932,41 @@
                     </a:p>
                   </a:txBody>
                   <a:tcPr>
-                    <a:lnL w="12700" cmpd="sng">
-                      <a:noFill/>
+                    <a:lnL w="12700" cap="flat" cmpd="sng" algn="ctr">
+                      <a:solidFill>
+                        <a:schemeClr val="tx1"/>
+                      </a:solidFill>
+                      <a:prstDash val="solid"/>
+                      <a:round/>
+                      <a:headEnd type="none" w="med" len="med"/>
+                      <a:tailEnd type="none" w="med" len="med"/>
                     </a:lnL>
-                    <a:lnR w="12700" cmpd="sng">
-                      <a:noFill/>
+                    <a:lnR w="12700" cap="flat" cmpd="sng" algn="ctr">
+                      <a:solidFill>
+                        <a:schemeClr val="tx1"/>
+                      </a:solidFill>
+                      <a:prstDash val="solid"/>
+                      <a:round/>
+                      <a:headEnd type="none" w="med" len="med"/>
+                      <a:tailEnd type="none" w="med" len="med"/>
                     </a:lnR>
-                    <a:lnT w="12700" cmpd="sng">
-                      <a:noFill/>
+                    <a:lnT w="12700" cap="flat" cmpd="sng" algn="ctr">
+                      <a:solidFill>
+                        <a:schemeClr val="tx1"/>
+                      </a:solidFill>
+                      <a:prstDash val="solid"/>
+                      <a:round/>
+                      <a:headEnd type="none" w="med" len="med"/>
+                      <a:tailEnd type="none" w="med" len="med"/>
                     </a:lnT>
-                    <a:lnB w="12700" cmpd="sng">
-                      <a:noFill/>
+                    <a:lnB w="12700" cap="flat" cmpd="sng" algn="ctr">
+                      <a:solidFill>
+                        <a:schemeClr val="tx1"/>
+                      </a:solidFill>
+                      <a:prstDash val="solid"/>
+                      <a:round/>
+                      <a:headEnd type="none" w="med" len="med"/>
+                      <a:tailEnd type="none" w="med" len="med"/>
                     </a:lnB>
                     <a:lnTlToBr w="12700" cmpd="sng">
                       <a:noFill/>
@@ -3933,28 +3984,77 @@
                     <a:bodyPr/>
                     <a:lstStyle/>
                     <a:p>
+                      <a:pPr marL="0" marR="0" lvl="0" indent="0" algn="l" defTabSz="914400" rtl="0" eaLnBrk="1" fontAlgn="auto" latinLnBrk="0" hangingPunct="1">
+                        <a:lnSpc>
+                          <a:spcPct val="100000"/>
+                        </a:lnSpc>
+                        <a:spcBef>
+                          <a:spcPts val="0"/>
+                        </a:spcBef>
+                        <a:spcAft>
+                          <a:spcPts val="0"/>
+                        </a:spcAft>
+                        <a:buClrTx/>
+                        <a:buSzTx/>
+                        <a:buFontTx/>
+                        <a:buNone/>
+                        <a:tabLst/>
+                        <a:defRPr/>
+                      </a:pPr>
                       <a:r>
                         <a:rPr lang="en-US" sz="2000" b="0" dirty="0">
                           <a:solidFill>
                             <a:schemeClr val="tx1"/>
                           </a:solidFill>
                         </a:rPr>
-                        <a:t>/account/changepassword</a:t>
+                        <a:t>/account/</a:t>
+                      </a:r>
+                      <a:r>
+                        <a:rPr lang="en-US" sz="2000" b="0">
+                          <a:solidFill>
+                            <a:schemeClr val="tx1"/>
+                          </a:solidFill>
+                        </a:rPr>
+                        <a:t>myaccount</a:t>
                       </a:r>
                     </a:p>
                   </a:txBody>
                   <a:tcPr>
-                    <a:lnL w="12700" cmpd="sng">
-                      <a:noFill/>
+                    <a:lnL w="12700" cap="flat" cmpd="sng" algn="ctr">
+                      <a:solidFill>
+                        <a:schemeClr val="tx1"/>
+                      </a:solidFill>
+                      <a:prstDash val="solid"/>
+                      <a:round/>
+                      <a:headEnd type="none" w="med" len="med"/>
+                      <a:tailEnd type="none" w="med" len="med"/>
                     </a:lnL>
-                    <a:lnR w="12700" cmpd="sng">
-                      <a:noFill/>
+                    <a:lnR w="12700" cap="flat" cmpd="sng" algn="ctr">
+                      <a:solidFill>
+                        <a:schemeClr val="tx1"/>
+                      </a:solidFill>
+                      <a:prstDash val="solid"/>
+                      <a:round/>
+                      <a:headEnd type="none" w="med" len="med"/>
+                      <a:tailEnd type="none" w="med" len="med"/>
                     </a:lnR>
-                    <a:lnT w="12700" cmpd="sng">
-                      <a:noFill/>
+                    <a:lnT w="12700" cap="flat" cmpd="sng" algn="ctr">
+                      <a:solidFill>
+                        <a:schemeClr val="tx1"/>
+                      </a:solidFill>
+                      <a:prstDash val="solid"/>
+                      <a:round/>
+                      <a:headEnd type="none" w="med" len="med"/>
+                      <a:tailEnd type="none" w="med" len="med"/>
                     </a:lnT>
-                    <a:lnB w="12700" cmpd="sng">
-                      <a:noFill/>
+                    <a:lnB w="12700" cap="flat" cmpd="sng" algn="ctr">
+                      <a:solidFill>
+                        <a:schemeClr val="tx1"/>
+                      </a:solidFill>
+                      <a:prstDash val="solid"/>
+                      <a:round/>
+                      <a:headEnd type="none" w="med" len="med"/>
+                      <a:tailEnd type="none" w="med" len="med"/>
                     </a:lnB>
                     <a:lnTlToBr w="12700" cmpd="sng">
                       <a:noFill/>
@@ -4003,17 +4103,41 @@
                     </a:p>
                   </a:txBody>
                   <a:tcPr>
-                    <a:lnL w="12700" cmpd="sng">
-                      <a:noFill/>
+                    <a:lnL w="12700" cap="flat" cmpd="sng" algn="ctr">
+                      <a:solidFill>
+                        <a:schemeClr val="tx1"/>
+                      </a:solidFill>
+                      <a:prstDash val="solid"/>
+                      <a:round/>
+                      <a:headEnd type="none" w="med" len="med"/>
+                      <a:tailEnd type="none" w="med" len="med"/>
                     </a:lnL>
-                    <a:lnR w="12700" cmpd="sng">
-                      <a:noFill/>
+                    <a:lnR w="12700" cap="flat" cmpd="sng" algn="ctr">
+                      <a:solidFill>
+                        <a:schemeClr val="tx1"/>
+                      </a:solidFill>
+                      <a:prstDash val="solid"/>
+                      <a:round/>
+                      <a:headEnd type="none" w="med" len="med"/>
+                      <a:tailEnd type="none" w="med" len="med"/>
                     </a:lnR>
-                    <a:lnT w="12700" cmpd="sng">
-                      <a:noFill/>
+                    <a:lnT w="12700" cap="flat" cmpd="sng" algn="ctr">
+                      <a:solidFill>
+                        <a:schemeClr val="tx1"/>
+                      </a:solidFill>
+                      <a:prstDash val="solid"/>
+                      <a:round/>
+                      <a:headEnd type="none" w="med" len="med"/>
+                      <a:tailEnd type="none" w="med" len="med"/>
                     </a:lnT>
-                    <a:lnB w="12700" cmpd="sng">
-                      <a:noFill/>
+                    <a:lnB w="12700" cap="flat" cmpd="sng" algn="ctr">
+                      <a:solidFill>
+                        <a:schemeClr val="tx1"/>
+                      </a:solidFill>
+                      <a:prstDash val="solid"/>
+                      <a:round/>
+                      <a:headEnd type="none" w="med" len="med"/>
+                      <a:tailEnd type="none" w="med" len="med"/>
                     </a:lnB>
                     <a:lnTlToBr w="12700" cmpd="sng">
                       <a:noFill/>
@@ -4031,28 +4155,49 @@
                     <a:bodyPr/>
                     <a:lstStyle/>
                     <a:p>
-                      <a:r>
-                        <a:rPr lang="en-US" sz="2000" b="0" dirty="0">
-                          <a:solidFill>
-                            <a:schemeClr val="tx1"/>
-                          </a:solidFill>
-                        </a:rPr>
-                        <a:t>/account/myaccount</a:t>
-                      </a:r>
+                      <a:endParaRPr lang="en-US" sz="2000" b="0" dirty="0">
+                        <a:solidFill>
+                          <a:schemeClr val="tx1"/>
+                        </a:solidFill>
+                      </a:endParaRPr>
                     </a:p>
                   </a:txBody>
                   <a:tcPr>
-                    <a:lnL w="12700" cmpd="sng">
-                      <a:noFill/>
+                    <a:lnL w="12700" cap="flat" cmpd="sng" algn="ctr">
+                      <a:solidFill>
+                        <a:schemeClr val="tx1"/>
+                      </a:solidFill>
+                      <a:prstDash val="solid"/>
+                      <a:round/>
+                      <a:headEnd type="none" w="med" len="med"/>
+                      <a:tailEnd type="none" w="med" len="med"/>
                     </a:lnL>
-                    <a:lnR w="12700" cmpd="sng">
-                      <a:noFill/>
+                    <a:lnR w="12700" cap="flat" cmpd="sng" algn="ctr">
+                      <a:solidFill>
+                        <a:schemeClr val="tx1"/>
+                      </a:solidFill>
+                      <a:prstDash val="solid"/>
+                      <a:round/>
+                      <a:headEnd type="none" w="med" len="med"/>
+                      <a:tailEnd type="none" w="med" len="med"/>
                     </a:lnR>
-                    <a:lnT w="12700" cmpd="sng">
-                      <a:noFill/>
+                    <a:lnT w="12700" cap="flat" cmpd="sng" algn="ctr">
+                      <a:solidFill>
+                        <a:schemeClr val="tx1"/>
+                      </a:solidFill>
+                      <a:prstDash val="solid"/>
+                      <a:round/>
+                      <a:headEnd type="none" w="med" len="med"/>
+                      <a:tailEnd type="none" w="med" len="med"/>
                     </a:lnT>
-                    <a:lnB w="12700" cmpd="sng">
-                      <a:noFill/>
+                    <a:lnB w="12700" cap="flat" cmpd="sng" algn="ctr">
+                      <a:solidFill>
+                        <a:schemeClr val="tx1"/>
+                      </a:solidFill>
+                      <a:prstDash val="solid"/>
+                      <a:round/>
+                      <a:headEnd type="none" w="med" len="med"/>
+                      <a:tailEnd type="none" w="med" len="med"/>
                     </a:lnB>
                     <a:lnTlToBr w="12700" cmpd="sng">
                       <a:noFill/>
@@ -4088,17 +4233,41 @@
                     </a:p>
                   </a:txBody>
                   <a:tcPr>
-                    <a:lnL w="12700" cmpd="sng">
-                      <a:noFill/>
+                    <a:lnL w="12700" cap="flat" cmpd="sng" algn="ctr">
+                      <a:solidFill>
+                        <a:schemeClr val="tx1"/>
+                      </a:solidFill>
+                      <a:prstDash val="solid"/>
+                      <a:round/>
+                      <a:headEnd type="none" w="med" len="med"/>
+                      <a:tailEnd type="none" w="med" len="med"/>
                     </a:lnL>
-                    <a:lnR w="12700" cmpd="sng">
-                      <a:noFill/>
+                    <a:lnR w="12700" cap="flat" cmpd="sng" algn="ctr">
+                      <a:solidFill>
+                        <a:schemeClr val="tx1"/>
+                      </a:solidFill>
+                      <a:prstDash val="solid"/>
+                      <a:round/>
+                      <a:headEnd type="none" w="med" len="med"/>
+                      <a:tailEnd type="none" w="med" len="med"/>
                     </a:lnR>
-                    <a:lnT w="12700" cmpd="sng">
-                      <a:noFill/>
+                    <a:lnT w="12700" cap="flat" cmpd="sng" algn="ctr">
+                      <a:solidFill>
+                        <a:schemeClr val="tx1"/>
+                      </a:solidFill>
+                      <a:prstDash val="solid"/>
+                      <a:round/>
+                      <a:headEnd type="none" w="med" len="med"/>
+                      <a:tailEnd type="none" w="med" len="med"/>
                     </a:lnT>
-                    <a:lnB w="12700" cmpd="sng">
-                      <a:noFill/>
+                    <a:lnB w="12700" cap="flat" cmpd="sng" algn="ctr">
+                      <a:solidFill>
+                        <a:schemeClr val="tx1"/>
+                      </a:solidFill>
+                      <a:prstDash val="solid"/>
+                      <a:round/>
+                      <a:headEnd type="none" w="med" len="med"/>
+                      <a:tailEnd type="none" w="med" len="med"/>
                     </a:lnB>
                     <a:lnTlToBr w="12700" cmpd="sng">
                       <a:noFill/>
@@ -4124,17 +4293,41 @@
                     </a:p>
                   </a:txBody>
                   <a:tcPr>
-                    <a:lnL w="12700" cmpd="sng">
-                      <a:noFill/>
+                    <a:lnL w="12700" cap="flat" cmpd="sng" algn="ctr">
+                      <a:solidFill>
+                        <a:schemeClr val="tx1"/>
+                      </a:solidFill>
+                      <a:prstDash val="solid"/>
+                      <a:round/>
+                      <a:headEnd type="none" w="med" len="med"/>
+                      <a:tailEnd type="none" w="med" len="med"/>
                     </a:lnL>
-                    <a:lnR w="12700" cmpd="sng">
-                      <a:noFill/>
+                    <a:lnR w="12700" cap="flat" cmpd="sng" algn="ctr">
+                      <a:solidFill>
+                        <a:schemeClr val="tx1"/>
+                      </a:solidFill>
+                      <a:prstDash val="solid"/>
+                      <a:round/>
+                      <a:headEnd type="none" w="med" len="med"/>
+                      <a:tailEnd type="none" w="med" len="med"/>
                     </a:lnR>
-                    <a:lnT w="12700" cmpd="sng">
-                      <a:noFill/>
+                    <a:lnT w="12700" cap="flat" cmpd="sng" algn="ctr">
+                      <a:solidFill>
+                        <a:schemeClr val="tx1"/>
+                      </a:solidFill>
+                      <a:prstDash val="solid"/>
+                      <a:round/>
+                      <a:headEnd type="none" w="med" len="med"/>
+                      <a:tailEnd type="none" w="med" len="med"/>
                     </a:lnT>
-                    <a:lnB w="12700" cmpd="sng">
-                      <a:noFill/>
+                    <a:lnB w="12700" cap="flat" cmpd="sng" algn="ctr">
+                      <a:solidFill>
+                        <a:schemeClr val="tx1"/>
+                      </a:solidFill>
+                      <a:prstDash val="solid"/>
+                      <a:round/>
+                      <a:headEnd type="none" w="med" len="med"/>
+                      <a:tailEnd type="none" w="med" len="med"/>
                     </a:lnB>
                     <a:lnTlToBr w="12700" cmpd="sng">
                       <a:noFill/>
@@ -4170,17 +4363,41 @@
                     </a:p>
                   </a:txBody>
                   <a:tcPr>
-                    <a:lnL w="12700" cmpd="sng">
-                      <a:noFill/>
+                    <a:lnL w="12700" cap="flat" cmpd="sng" algn="ctr">
+                      <a:solidFill>
+                        <a:schemeClr val="tx1"/>
+                      </a:solidFill>
+                      <a:prstDash val="solid"/>
+                      <a:round/>
+                      <a:headEnd type="none" w="med" len="med"/>
+                      <a:tailEnd type="none" w="med" len="med"/>
                     </a:lnL>
-                    <a:lnR w="12700" cmpd="sng">
-                      <a:noFill/>
+                    <a:lnR w="12700" cap="flat" cmpd="sng" algn="ctr">
+                      <a:solidFill>
+                        <a:schemeClr val="tx1"/>
+                      </a:solidFill>
+                      <a:prstDash val="solid"/>
+                      <a:round/>
+                      <a:headEnd type="none" w="med" len="med"/>
+                      <a:tailEnd type="none" w="med" len="med"/>
                     </a:lnR>
-                    <a:lnT w="12700" cmpd="sng">
-                      <a:noFill/>
+                    <a:lnT w="12700" cap="flat" cmpd="sng" algn="ctr">
+                      <a:solidFill>
+                        <a:schemeClr val="tx1"/>
+                      </a:solidFill>
+                      <a:prstDash val="solid"/>
+                      <a:round/>
+                      <a:headEnd type="none" w="med" len="med"/>
+                      <a:tailEnd type="none" w="med" len="med"/>
                     </a:lnT>
-                    <a:lnB w="12700" cmpd="sng">
-                      <a:noFill/>
+                    <a:lnB w="12700" cap="flat" cmpd="sng" algn="ctr">
+                      <a:solidFill>
+                        <a:schemeClr val="tx1"/>
+                      </a:solidFill>
+                      <a:prstDash val="solid"/>
+                      <a:round/>
+                      <a:headEnd type="none" w="med" len="med"/>
+                      <a:tailEnd type="none" w="med" len="med"/>
                     </a:lnB>
                     <a:lnTlToBr w="12700" cmpd="sng">
                       <a:noFill/>
@@ -4206,17 +4423,41 @@
                     </a:p>
                   </a:txBody>
                   <a:tcPr>
-                    <a:lnL w="12700" cmpd="sng">
-                      <a:noFill/>
+                    <a:lnL w="12700" cap="flat" cmpd="sng" algn="ctr">
+                      <a:solidFill>
+                        <a:schemeClr val="tx1"/>
+                      </a:solidFill>
+                      <a:prstDash val="solid"/>
+                      <a:round/>
+                      <a:headEnd type="none" w="med" len="med"/>
+                      <a:tailEnd type="none" w="med" len="med"/>
                     </a:lnL>
-                    <a:lnR w="12700" cmpd="sng">
-                      <a:noFill/>
+                    <a:lnR w="12700" cap="flat" cmpd="sng" algn="ctr">
+                      <a:solidFill>
+                        <a:schemeClr val="tx1"/>
+                      </a:solidFill>
+                      <a:prstDash val="solid"/>
+                      <a:round/>
+                      <a:headEnd type="none" w="med" len="med"/>
+                      <a:tailEnd type="none" w="med" len="med"/>
                     </a:lnR>
-                    <a:lnT w="12700" cmpd="sng">
-                      <a:noFill/>
+                    <a:lnT w="12700" cap="flat" cmpd="sng" algn="ctr">
+                      <a:solidFill>
+                        <a:schemeClr val="tx1"/>
+                      </a:solidFill>
+                      <a:prstDash val="solid"/>
+                      <a:round/>
+                      <a:headEnd type="none" w="med" len="med"/>
+                      <a:tailEnd type="none" w="med" len="med"/>
                     </a:lnT>
-                    <a:lnB w="12700" cmpd="sng">
-                      <a:noFill/>
+                    <a:lnB w="12700" cap="flat" cmpd="sng" algn="ctr">
+                      <a:solidFill>
+                        <a:schemeClr val="tx1"/>
+                      </a:solidFill>
+                      <a:prstDash val="solid"/>
+                      <a:round/>
+                      <a:headEnd type="none" w="med" len="med"/>
+                      <a:tailEnd type="none" w="med" len="med"/>
                     </a:lnB>
                     <a:lnTlToBr w="12700" cmpd="sng">
                       <a:noFill/>
@@ -4241,28 +4482,69 @@
                     <a:bodyPr/>
                     <a:lstStyle/>
                     <a:p>
+                      <a:pPr marL="0" marR="0" lvl="0" indent="0" algn="l" defTabSz="914400" rtl="0" eaLnBrk="1" fontAlgn="auto" latinLnBrk="0" hangingPunct="1">
+                        <a:lnSpc>
+                          <a:spcPct val="100000"/>
+                        </a:lnSpc>
+                        <a:spcBef>
+                          <a:spcPts val="0"/>
+                        </a:spcBef>
+                        <a:spcAft>
+                          <a:spcPts val="0"/>
+                        </a:spcAft>
+                        <a:buClrTx/>
+                        <a:buSzTx/>
+                        <a:buFontTx/>
+                        <a:buNone/>
+                        <a:tabLst/>
+                        <a:defRPr/>
+                      </a:pPr>
                       <a:r>
                         <a:rPr lang="en-US" sz="2000" b="0" dirty="0">
                           <a:solidFill>
                             <a:schemeClr val="tx1"/>
                           </a:solidFill>
                         </a:rPr>
-                        <a:t>/category/other</a:t>
+                        <a:t>/category/custom-category-here</a:t>
                       </a:r>
                     </a:p>
                   </a:txBody>
                   <a:tcPr>
-                    <a:lnL w="12700" cmpd="sng">
-                      <a:noFill/>
+                    <a:lnL w="12700" cap="flat" cmpd="sng" algn="ctr">
+                      <a:solidFill>
+                        <a:schemeClr val="tx1"/>
+                      </a:solidFill>
+                      <a:prstDash val="solid"/>
+                      <a:round/>
+                      <a:headEnd type="none" w="med" len="med"/>
+                      <a:tailEnd type="none" w="med" len="med"/>
                     </a:lnL>
-                    <a:lnR w="12700" cmpd="sng">
-                      <a:noFill/>
+                    <a:lnR w="12700" cap="flat" cmpd="sng" algn="ctr">
+                      <a:solidFill>
+                        <a:schemeClr val="tx1"/>
+                      </a:solidFill>
+                      <a:prstDash val="solid"/>
+                      <a:round/>
+                      <a:headEnd type="none" w="med" len="med"/>
+                      <a:tailEnd type="none" w="med" len="med"/>
                     </a:lnR>
-                    <a:lnT w="12700" cmpd="sng">
-                      <a:noFill/>
+                    <a:lnT w="12700" cap="flat" cmpd="sng" algn="ctr">
+                      <a:solidFill>
+                        <a:schemeClr val="tx1"/>
+                      </a:solidFill>
+                      <a:prstDash val="solid"/>
+                      <a:round/>
+                      <a:headEnd type="none" w="med" len="med"/>
+                      <a:tailEnd type="none" w="med" len="med"/>
                     </a:lnT>
-                    <a:lnB w="12700" cmpd="sng">
-                      <a:noFill/>
+                    <a:lnB w="12700" cap="flat" cmpd="sng" algn="ctr">
+                      <a:solidFill>
+                        <a:schemeClr val="tx1"/>
+                      </a:solidFill>
+                      <a:prstDash val="solid"/>
+                      <a:round/>
+                      <a:headEnd type="none" w="med" len="med"/>
+                      <a:tailEnd type="none" w="med" len="med"/>
                     </a:lnB>
                     <a:lnTlToBr w="12700" cmpd="sng">
                       <a:noFill/>
@@ -4288,17 +4570,41 @@
                     </a:p>
                   </a:txBody>
                   <a:tcPr>
-                    <a:lnL w="12700" cmpd="sng">
-                      <a:noFill/>
+                    <a:lnL w="12700" cap="flat" cmpd="sng" algn="ctr">
+                      <a:solidFill>
+                        <a:schemeClr val="tx1"/>
+                      </a:solidFill>
+                      <a:prstDash val="solid"/>
+                      <a:round/>
+                      <a:headEnd type="none" w="med" len="med"/>
+                      <a:tailEnd type="none" w="med" len="med"/>
                     </a:lnL>
-                    <a:lnR w="12700" cmpd="sng">
-                      <a:noFill/>
+                    <a:lnR w="12700" cap="flat" cmpd="sng" algn="ctr">
+                      <a:solidFill>
+                        <a:schemeClr val="tx1"/>
+                      </a:solidFill>
+                      <a:prstDash val="solid"/>
+                      <a:round/>
+                      <a:headEnd type="none" w="med" len="med"/>
+                      <a:tailEnd type="none" w="med" len="med"/>
                     </a:lnR>
-                    <a:lnT w="12700" cmpd="sng">
-                      <a:noFill/>
+                    <a:lnT w="12700" cap="flat" cmpd="sng" algn="ctr">
+                      <a:solidFill>
+                        <a:schemeClr val="tx1"/>
+                      </a:solidFill>
+                      <a:prstDash val="solid"/>
+                      <a:round/>
+                      <a:headEnd type="none" w="med" len="med"/>
+                      <a:tailEnd type="none" w="med" len="med"/>
                     </a:lnT>
-                    <a:lnB w="12700" cmpd="sng">
-                      <a:noFill/>
+                    <a:lnB w="12700" cap="flat" cmpd="sng" algn="ctr">
+                      <a:solidFill>
+                        <a:schemeClr val="tx1"/>
+                      </a:solidFill>
+                      <a:prstDash val="solid"/>
+                      <a:round/>
+                      <a:headEnd type="none" w="med" len="med"/>
+                      <a:tailEnd type="none" w="med" len="med"/>
                     </a:lnB>
                     <a:lnTlToBr w="12700" cmpd="sng">
                       <a:noFill/>
@@ -4329,22 +4635,46 @@
                             <a:schemeClr val="tx1"/>
                           </a:solidFill>
                         </a:rPr>
-                        <a:t>/category/custom-category-here</a:t>
+                        <a:t>/category/question-id</a:t>
                       </a:r>
                     </a:p>
                   </a:txBody>
                   <a:tcPr>
-                    <a:lnL w="12700" cmpd="sng">
-                      <a:noFill/>
+                    <a:lnL w="12700" cap="flat" cmpd="sng" algn="ctr">
+                      <a:solidFill>
+                        <a:schemeClr val="tx1"/>
+                      </a:solidFill>
+                      <a:prstDash val="solid"/>
+                      <a:round/>
+                      <a:headEnd type="none" w="med" len="med"/>
+                      <a:tailEnd type="none" w="med" len="med"/>
                     </a:lnL>
-                    <a:lnR w="12700" cmpd="sng">
-                      <a:noFill/>
+                    <a:lnR w="12700" cap="flat" cmpd="sng" algn="ctr">
+                      <a:solidFill>
+                        <a:schemeClr val="tx1"/>
+                      </a:solidFill>
+                      <a:prstDash val="solid"/>
+                      <a:round/>
+                      <a:headEnd type="none" w="med" len="med"/>
+                      <a:tailEnd type="none" w="med" len="med"/>
                     </a:lnR>
-                    <a:lnT w="12700" cmpd="sng">
-                      <a:noFill/>
+                    <a:lnT w="12700" cap="flat" cmpd="sng" algn="ctr">
+                      <a:solidFill>
+                        <a:schemeClr val="tx1"/>
+                      </a:solidFill>
+                      <a:prstDash val="solid"/>
+                      <a:round/>
+                      <a:headEnd type="none" w="med" len="med"/>
+                      <a:tailEnd type="none" w="med" len="med"/>
                     </a:lnT>
-                    <a:lnB w="12700" cmpd="sng">
-                      <a:noFill/>
+                    <a:lnB w="12700" cap="flat" cmpd="sng" algn="ctr">
+                      <a:solidFill>
+                        <a:schemeClr val="tx1"/>
+                      </a:solidFill>
+                      <a:prstDash val="solid"/>
+                      <a:round/>
+                      <a:headEnd type="none" w="med" len="med"/>
+                      <a:tailEnd type="none" w="med" len="med"/>
                     </a:lnB>
                     <a:lnTlToBr w="12700" cmpd="sng">
                       <a:noFill/>
@@ -4370,17 +4700,41 @@
                     </a:p>
                   </a:txBody>
                   <a:tcPr>
-                    <a:lnL w="12700" cmpd="sng">
-                      <a:noFill/>
+                    <a:lnL w="12700" cap="flat" cmpd="sng" algn="ctr">
+                      <a:solidFill>
+                        <a:schemeClr val="tx1"/>
+                      </a:solidFill>
+                      <a:prstDash val="solid"/>
+                      <a:round/>
+                      <a:headEnd type="none" w="med" len="med"/>
+                      <a:tailEnd type="none" w="med" len="med"/>
                     </a:lnL>
-                    <a:lnR w="12700" cmpd="sng">
-                      <a:noFill/>
+                    <a:lnR w="12700" cap="flat" cmpd="sng" algn="ctr">
+                      <a:solidFill>
+                        <a:schemeClr val="tx1"/>
+                      </a:solidFill>
+                      <a:prstDash val="solid"/>
+                      <a:round/>
+                      <a:headEnd type="none" w="med" len="med"/>
+                      <a:tailEnd type="none" w="med" len="med"/>
                     </a:lnR>
-                    <a:lnT w="12700" cmpd="sng">
-                      <a:noFill/>
+                    <a:lnT w="12700" cap="flat" cmpd="sng" algn="ctr">
+                      <a:solidFill>
+                        <a:schemeClr val="tx1"/>
+                      </a:solidFill>
+                      <a:prstDash val="solid"/>
+                      <a:round/>
+                      <a:headEnd type="none" w="med" len="med"/>
+                      <a:tailEnd type="none" w="med" len="med"/>
                     </a:lnT>
-                    <a:lnB w="12700" cmpd="sng">
-                      <a:noFill/>
+                    <a:lnB w="12700" cap="flat" cmpd="sng" algn="ctr">
+                      <a:solidFill>
+                        <a:schemeClr val="tx1"/>
+                      </a:solidFill>
+                      <a:prstDash val="solid"/>
+                      <a:round/>
+                      <a:headEnd type="none" w="med" len="med"/>
+                      <a:tailEnd type="none" w="med" len="med"/>
                     </a:lnB>
                     <a:lnTlToBr w="12700" cmpd="sng">
                       <a:noFill/>
@@ -4416,17 +4770,41 @@
                     </a:p>
                   </a:txBody>
                   <a:tcPr>
-                    <a:lnL w="12700" cmpd="sng">
-                      <a:noFill/>
+                    <a:lnL w="12700" cap="flat" cmpd="sng" algn="ctr">
+                      <a:solidFill>
+                        <a:schemeClr val="tx1"/>
+                      </a:solidFill>
+                      <a:prstDash val="solid"/>
+                      <a:round/>
+                      <a:headEnd type="none" w="med" len="med"/>
+                      <a:tailEnd type="none" w="med" len="med"/>
                     </a:lnL>
-                    <a:lnR w="12700" cmpd="sng">
-                      <a:noFill/>
+                    <a:lnR w="12700" cap="flat" cmpd="sng" algn="ctr">
+                      <a:solidFill>
+                        <a:schemeClr val="tx1"/>
+                      </a:solidFill>
+                      <a:prstDash val="solid"/>
+                      <a:round/>
+                      <a:headEnd type="none" w="med" len="med"/>
+                      <a:tailEnd type="none" w="med" len="med"/>
                     </a:lnR>
-                    <a:lnT w="12700" cmpd="sng">
-                      <a:noFill/>
+                    <a:lnT w="12700" cap="flat" cmpd="sng" algn="ctr">
+                      <a:solidFill>
+                        <a:schemeClr val="tx1"/>
+                      </a:solidFill>
+                      <a:prstDash val="solid"/>
+                      <a:round/>
+                      <a:headEnd type="none" w="med" len="med"/>
+                      <a:tailEnd type="none" w="med" len="med"/>
                     </a:lnT>
-                    <a:lnB w="12700" cmpd="sng">
-                      <a:noFill/>
+                    <a:lnB w="12700" cap="flat" cmpd="sng" algn="ctr">
+                      <a:solidFill>
+                        <a:schemeClr val="tx1"/>
+                      </a:solidFill>
+                      <a:prstDash val="solid"/>
+                      <a:round/>
+                      <a:headEnd type="none" w="med" len="med"/>
+                      <a:tailEnd type="none" w="med" len="med"/>
                     </a:lnB>
                     <a:lnTlToBr w="12700" cmpd="sng">
                       <a:noFill/>
@@ -4452,17 +4830,41 @@
                     </a:p>
                   </a:txBody>
                   <a:tcPr>
-                    <a:lnL w="12700" cmpd="sng">
-                      <a:noFill/>
+                    <a:lnL w="12700" cap="flat" cmpd="sng" algn="ctr">
+                      <a:solidFill>
+                        <a:schemeClr val="tx1"/>
+                      </a:solidFill>
+                      <a:prstDash val="solid"/>
+                      <a:round/>
+                      <a:headEnd type="none" w="med" len="med"/>
+                      <a:tailEnd type="none" w="med" len="med"/>
                     </a:lnL>
-                    <a:lnR w="12700" cmpd="sng">
-                      <a:noFill/>
+                    <a:lnR w="12700" cap="flat" cmpd="sng" algn="ctr">
+                      <a:solidFill>
+                        <a:schemeClr val="tx1"/>
+                      </a:solidFill>
+                      <a:prstDash val="solid"/>
+                      <a:round/>
+                      <a:headEnd type="none" w="med" len="med"/>
+                      <a:tailEnd type="none" w="med" len="med"/>
                     </a:lnR>
-                    <a:lnT w="12700" cmpd="sng">
-                      <a:noFill/>
+                    <a:lnT w="12700" cap="flat" cmpd="sng" algn="ctr">
+                      <a:solidFill>
+                        <a:schemeClr val="tx1"/>
+                      </a:solidFill>
+                      <a:prstDash val="solid"/>
+                      <a:round/>
+                      <a:headEnd type="none" w="med" len="med"/>
+                      <a:tailEnd type="none" w="med" len="med"/>
                     </a:lnT>
-                    <a:lnB w="12700" cmpd="sng">
-                      <a:noFill/>
+                    <a:lnB w="12700" cap="flat" cmpd="sng" algn="ctr">
+                      <a:solidFill>
+                        <a:schemeClr val="tx1"/>
+                      </a:solidFill>
+                      <a:prstDash val="solid"/>
+                      <a:round/>
+                      <a:headEnd type="none" w="med" len="med"/>
+                      <a:tailEnd type="none" w="med" len="med"/>
                     </a:lnB>
                     <a:lnTlToBr w="12700" cmpd="sng">
                       <a:noFill/>
@@ -4498,17 +4900,41 @@
                     </a:p>
                   </a:txBody>
                   <a:tcPr>
-                    <a:lnL w="12700" cmpd="sng">
-                      <a:noFill/>
+                    <a:lnL w="12700" cap="flat" cmpd="sng" algn="ctr">
+                      <a:solidFill>
+                        <a:schemeClr val="tx1"/>
+                      </a:solidFill>
+                      <a:prstDash val="solid"/>
+                      <a:round/>
+                      <a:headEnd type="none" w="med" len="med"/>
+                      <a:tailEnd type="none" w="med" len="med"/>
                     </a:lnL>
-                    <a:lnR w="12700" cmpd="sng">
-                      <a:noFill/>
+                    <a:lnR w="12700" cap="flat" cmpd="sng" algn="ctr">
+                      <a:solidFill>
+                        <a:schemeClr val="tx1"/>
+                      </a:solidFill>
+                      <a:prstDash val="solid"/>
+                      <a:round/>
+                      <a:headEnd type="none" w="med" len="med"/>
+                      <a:tailEnd type="none" w="med" len="med"/>
                     </a:lnR>
-                    <a:lnT w="12700" cmpd="sng">
-                      <a:noFill/>
+                    <a:lnT w="12700" cap="flat" cmpd="sng" algn="ctr">
+                      <a:solidFill>
+                        <a:schemeClr val="tx1"/>
+                      </a:solidFill>
+                      <a:prstDash val="solid"/>
+                      <a:round/>
+                      <a:headEnd type="none" w="med" len="med"/>
+                      <a:tailEnd type="none" w="med" len="med"/>
                     </a:lnT>
-                    <a:lnB w="12700" cmpd="sng">
-                      <a:noFill/>
+                    <a:lnB w="12700" cap="flat" cmpd="sng" algn="ctr">
+                      <a:solidFill>
+                        <a:schemeClr val="tx1"/>
+                      </a:solidFill>
+                      <a:prstDash val="solid"/>
+                      <a:round/>
+                      <a:headEnd type="none" w="med" len="med"/>
+                      <a:tailEnd type="none" w="med" len="med"/>
                     </a:lnB>
                     <a:lnTlToBr w="12700" cmpd="sng">
                       <a:noFill/>
@@ -4534,17 +4960,41 @@
                     </a:p>
                   </a:txBody>
                   <a:tcPr>
-                    <a:lnL w="12700" cmpd="sng">
-                      <a:noFill/>
+                    <a:lnL w="12700" cap="flat" cmpd="sng" algn="ctr">
+                      <a:solidFill>
+                        <a:schemeClr val="tx1"/>
+                      </a:solidFill>
+                      <a:prstDash val="solid"/>
+                      <a:round/>
+                      <a:headEnd type="none" w="med" len="med"/>
+                      <a:tailEnd type="none" w="med" len="med"/>
                     </a:lnL>
-                    <a:lnR w="12700" cmpd="sng">
-                      <a:noFill/>
+                    <a:lnR w="12700" cap="flat" cmpd="sng" algn="ctr">
+                      <a:solidFill>
+                        <a:schemeClr val="tx1"/>
+                      </a:solidFill>
+                      <a:prstDash val="solid"/>
+                      <a:round/>
+                      <a:headEnd type="none" w="med" len="med"/>
+                      <a:tailEnd type="none" w="med" len="med"/>
                     </a:lnR>
-                    <a:lnT w="12700" cmpd="sng">
-                      <a:noFill/>
+                    <a:lnT w="12700" cap="flat" cmpd="sng" algn="ctr">
+                      <a:solidFill>
+                        <a:schemeClr val="tx1"/>
+                      </a:solidFill>
+                      <a:prstDash val="solid"/>
+                      <a:round/>
+                      <a:headEnd type="none" w="med" len="med"/>
+                      <a:tailEnd type="none" w="med" len="med"/>
                     </a:lnT>
-                    <a:lnB w="12700" cmpd="sng">
-                      <a:noFill/>
+                    <a:lnB w="12700" cap="flat" cmpd="sng" algn="ctr">
+                      <a:solidFill>
+                        <a:schemeClr val="tx1"/>
+                      </a:solidFill>
+                      <a:prstDash val="solid"/>
+                      <a:round/>
+                      <a:headEnd type="none" w="med" len="med"/>
+                      <a:tailEnd type="none" w="med" len="med"/>
                     </a:lnB>
                     <a:lnTlToBr w="12700" cmpd="sng">
                       <a:noFill/>
@@ -4580,17 +5030,41 @@
                     </a:p>
                   </a:txBody>
                   <a:tcPr>
-                    <a:lnL w="12700" cmpd="sng">
-                      <a:noFill/>
+                    <a:lnL w="12700" cap="flat" cmpd="sng" algn="ctr">
+                      <a:solidFill>
+                        <a:schemeClr val="tx1"/>
+                      </a:solidFill>
+                      <a:prstDash val="solid"/>
+                      <a:round/>
+                      <a:headEnd type="none" w="med" len="med"/>
+                      <a:tailEnd type="none" w="med" len="med"/>
                     </a:lnL>
-                    <a:lnR w="12700" cmpd="sng">
-                      <a:noFill/>
+                    <a:lnR w="12700" cap="flat" cmpd="sng" algn="ctr">
+                      <a:solidFill>
+                        <a:schemeClr val="tx1"/>
+                      </a:solidFill>
+                      <a:prstDash val="solid"/>
+                      <a:round/>
+                      <a:headEnd type="none" w="med" len="med"/>
+                      <a:tailEnd type="none" w="med" len="med"/>
                     </a:lnR>
-                    <a:lnT w="12700" cmpd="sng">
-                      <a:noFill/>
+                    <a:lnT w="12700" cap="flat" cmpd="sng" algn="ctr">
+                      <a:solidFill>
+                        <a:schemeClr val="tx1"/>
+                      </a:solidFill>
+                      <a:prstDash val="solid"/>
+                      <a:round/>
+                      <a:headEnd type="none" w="med" len="med"/>
+                      <a:tailEnd type="none" w="med" len="med"/>
                     </a:lnT>
-                    <a:lnB w="12700" cmpd="sng">
-                      <a:noFill/>
+                    <a:lnB w="12700" cap="flat" cmpd="sng" algn="ctr">
+                      <a:solidFill>
+                        <a:schemeClr val="tx1"/>
+                      </a:solidFill>
+                      <a:prstDash val="solid"/>
+                      <a:round/>
+                      <a:headEnd type="none" w="med" len="med"/>
+                      <a:tailEnd type="none" w="med" len="med"/>
                     </a:lnB>
                     <a:lnTlToBr w="12700" cmpd="sng">
                       <a:noFill/>
@@ -4616,17 +5090,41 @@
                     </a:p>
                   </a:txBody>
                   <a:tcPr>
-                    <a:lnL w="12700" cmpd="sng">
-                      <a:noFill/>
+                    <a:lnL w="12700" cap="flat" cmpd="sng" algn="ctr">
+                      <a:solidFill>
+                        <a:schemeClr val="tx1"/>
+                      </a:solidFill>
+                      <a:prstDash val="solid"/>
+                      <a:round/>
+                      <a:headEnd type="none" w="med" len="med"/>
+                      <a:tailEnd type="none" w="med" len="med"/>
                     </a:lnL>
-                    <a:lnR w="12700" cmpd="sng">
-                      <a:noFill/>
+                    <a:lnR w="12700" cap="flat" cmpd="sng" algn="ctr">
+                      <a:solidFill>
+                        <a:schemeClr val="tx1"/>
+                      </a:solidFill>
+                      <a:prstDash val="solid"/>
+                      <a:round/>
+                      <a:headEnd type="none" w="med" len="med"/>
+                      <a:tailEnd type="none" w="med" len="med"/>
                     </a:lnR>
-                    <a:lnT w="12700" cmpd="sng">
-                      <a:noFill/>
+                    <a:lnT w="12700" cap="flat" cmpd="sng" algn="ctr">
+                      <a:solidFill>
+                        <a:schemeClr val="tx1"/>
+                      </a:solidFill>
+                      <a:prstDash val="solid"/>
+                      <a:round/>
+                      <a:headEnd type="none" w="med" len="med"/>
+                      <a:tailEnd type="none" w="med" len="med"/>
                     </a:lnT>
-                    <a:lnB w="12700" cmpd="sng">
-                      <a:noFill/>
+                    <a:lnB w="12700" cap="flat" cmpd="sng" algn="ctr">
+                      <a:solidFill>
+                        <a:schemeClr val="tx1"/>
+                      </a:solidFill>
+                      <a:prstDash val="solid"/>
+                      <a:round/>
+                      <a:headEnd type="none" w="med" len="med"/>
+                      <a:tailEnd type="none" w="med" len="med"/>
                     </a:lnB>
                     <a:lnTlToBr w="12700" cmpd="sng">
                       <a:noFill/>
@@ -4773,7 +5271,7 @@
         <p:spPr/>
         <p:txBody>
           <a:bodyPr>
-            <a:normAutofit fontScale="55000" lnSpcReduction="20000"/>
+            <a:normAutofit fontScale="47500" lnSpcReduction="20000"/>
           </a:bodyPr>
           <a:lstStyle/>
           <a:p>
@@ -4860,6 +5358,25 @@
             <a:r>
               <a:rPr lang="en-US" dirty="0"/>
               <a:t>Discuss on Thurs, might get too complex, alternatives?</a:t>
+            </a:r>
+          </a:p>
+          <a:p>
+            <a:pPr marL="0" indent="0">
+              <a:buNone/>
+            </a:pPr>
+            <a:endParaRPr lang="en-US" dirty="0"/>
+          </a:p>
+          <a:p>
+            <a:pPr marL="0" indent="0">
+              <a:buNone/>
+            </a:pPr>
+            <a:r>
+              <a:rPr lang="en-US" b="1" dirty="0">
+                <a:solidFill>
+                  <a:srgbClr val="C00000"/>
+                </a:solidFill>
+              </a:rPr>
+              <a:t>MAKE SURE WE WILL HAVE EVERYTHING FROM THE IMPLEMENTATION MARK SCHEME</a:t>
             </a:r>
           </a:p>
         </p:txBody>

</xml_diff>